<commit_message>
Continue to fill out class with more generated content
</commit_message>
<xml_diff>
--- a/module-02-line-tracking/slides/01-the-reflectance-sensor.pptx
+++ b/module-02-line-tracking/slides/01-the-reflectance-sensor.pptx
@@ -3185,7 +3185,7 @@
         <p:spPr>
           <a:xfrm>
             <a:off x="731520" y="914400"/>
-            <a:ext cx="10058400" cy="1097280"/>
+            <a:ext cx="10058400" cy="1371600"/>
           </a:xfrm>
           <a:prstGeom prst="rect">
             <a:avLst/>
@@ -3193,13 +3193,13 @@
           <a:noFill/>
         </p:spPr>
         <p:txBody>
-          <a:bodyPr wrap="none">
+          <a:bodyPr wrap="square">
             <a:spAutoFit/>
           </a:bodyPr>
           <a:lstStyle/>
           <a:p>
             <a:pPr>
-              <a:defRPr sz="4400" b="1">
+              <a:defRPr sz="4200" b="1">
                 <a:solidFill>
                   <a:srgbClr val="FFFFFF"/>
                 </a:solidFill>
@@ -3207,7 +3207,7 @@
               </a:defRPr>
             </a:pPr>
             <a:r>
-              <a:t>Lesson 1: The Reflectance Sensor</a:t>
+              <a:t>The Reflectance Sensor</a:t>
             </a:r>
           </a:p>
         </p:txBody>
@@ -3221,7 +3221,7 @@
         <p:spPr>
           <a:xfrm>
             <a:off x="731520" y="3108960"/>
-            <a:ext cx="5486400" cy="3200400"/>
+            <a:ext cx="5486400" cy="3474720"/>
           </a:xfrm>
           <a:prstGeom prst="rect">
             <a:avLst/>
@@ -3229,7 +3229,7 @@
           <a:noFill/>
         </p:spPr>
         <p:txBody>
-          <a:bodyPr wrap="none">
+          <a:bodyPr wrap="square">
             <a:spAutoFit/>
           </a:bodyPr>
           <a:lstStyle/>
@@ -3249,9 +3249,9 @@
           <a:p>
             <a:pPr>
               <a:spcAft>
-                <a:spcPts val="600"/>
-              </a:spcAft>
-              <a:defRPr sz="1800" b="0">
+                <a:spcPts val="400"/>
+              </a:spcAft>
+              <a:defRPr sz="1600" b="0">
                 <a:solidFill>
                   <a:srgbClr val="333333"/>
                 </a:solidFill>
@@ -3265,9 +3265,9 @@
           <a:p>
             <a:pPr>
               <a:spcAft>
-                <a:spcPts val="600"/>
-              </a:spcAft>
-              <a:defRPr sz="1800" b="0">
+                <a:spcPts val="400"/>
+              </a:spcAft>
+              <a:defRPr sz="1600" b="0">
                 <a:solidFill>
                   <a:srgbClr val="333333"/>
                 </a:solidFill>
@@ -3281,9 +3281,9 @@
           <a:p>
             <a:pPr>
               <a:spcAft>
-                <a:spcPts val="600"/>
-              </a:spcAft>
-              <a:defRPr sz="1800" b="0">
+                <a:spcPts val="400"/>
+              </a:spcAft>
+              <a:defRPr sz="1600" b="0">
                 <a:solidFill>
                   <a:srgbClr val="333333"/>
                 </a:solidFill>
@@ -3297,9 +3297,9 @@
           <a:p>
             <a:pPr>
               <a:spcAft>
-                <a:spcPts val="600"/>
-              </a:spcAft>
-              <a:defRPr sz="1800" b="0">
+                <a:spcPts val="400"/>
+              </a:spcAft>
+              <a:defRPr sz="1600" b="0">
                 <a:solidFill>
                   <a:srgbClr val="333333"/>
                 </a:solidFill>
@@ -3321,7 +3321,7 @@
         <p:spPr>
           <a:xfrm>
             <a:off x="6858000" y="3108960"/>
-            <a:ext cx="4572000" cy="3200400"/>
+            <a:ext cx="4572000" cy="3474720"/>
           </a:xfrm>
           <a:prstGeom prst="rect">
             <a:avLst/>
@@ -3329,7 +3329,7 @@
           <a:noFill/>
         </p:spPr>
         <p:txBody>
-          <a:bodyPr wrap="none">
+          <a:bodyPr wrap="square">
             <a:spAutoFit/>
           </a:bodyPr>
           <a:lstStyle/>
@@ -3349,9 +3349,9 @@
           <a:p>
             <a:pPr>
               <a:spcAft>
-                <a:spcPts val="600"/>
-              </a:spcAft>
-              <a:defRPr sz="1800" b="0">
+                <a:spcPts val="400"/>
+              </a:spcAft>
+              <a:defRPr sz="1600" b="0">
                 <a:solidFill>
                   <a:srgbClr val="333333"/>
                 </a:solidFill>
@@ -3359,15 +3359,15 @@
               </a:defRPr>
             </a:pPr>
             <a:r>
-              <a:t>How sensors work  (10 min)</a:t>
-            </a:r>
-          </a:p>
-          <a:p>
-            <a:pPr>
-              <a:spcAft>
-                <a:spcPts val="600"/>
-              </a:spcAft>
-              <a:defRPr sz="1800" b="0">
+              <a:t>How sensors work (10 min)</a:t>
+            </a:r>
+          </a:p>
+          <a:p>
+            <a:pPr>
+              <a:spcAft>
+                <a:spcPts val="400"/>
+              </a:spcAft>
+              <a:defRPr sz="1600" b="0">
                 <a:solidFill>
                   <a:srgbClr val="333333"/>
                 </a:solidFill>
@@ -3375,15 +3375,15 @@
               </a:defRPr>
             </a:pPr>
             <a:r>
-              <a:t>Reading sensor values  (15 min)</a:t>
-            </a:r>
-          </a:p>
-          <a:p>
-            <a:pPr>
-              <a:spcAft>
-                <a:spcPts val="600"/>
-              </a:spcAft>
-              <a:defRPr sz="1800" b="0">
+              <a:t>Reading sensor values (15 min)</a:t>
+            </a:r>
+          </a:p>
+          <a:p>
+            <a:pPr>
+              <a:spcAft>
+                <a:spcPts val="400"/>
+              </a:spcAft>
+              <a:defRPr sz="1600" b="0">
                 <a:solidFill>
                   <a:srgbClr val="333333"/>
                 </a:solidFill>
@@ -3391,7 +3391,7 @@
               </a:defRPr>
             </a:pPr>
             <a:r>
-              <a:t>Calibration exercise  (20 min)</a:t>
+              <a:t>Calibration exercise (20 min)</a:t>
             </a:r>
           </a:p>
         </p:txBody>
@@ -3502,7 +3502,7 @@
         <p:spPr>
           <a:xfrm>
             <a:off x="548640" y="1371600"/>
-            <a:ext cx="10972800" cy="5029200"/>
+            <a:ext cx="10972800" cy="365760"/>
           </a:xfrm>
           <a:prstGeom prst="rect">
             <a:avLst/>
@@ -3514,13 +3514,12 @@
             <a:spAutoFit/>
           </a:bodyPr>
           <a:lstStyle/>
-          <a:p/>
-          <a:p>
-            <a:pPr>
-              <a:spcAft>
-                <a:spcPts val="600"/>
-              </a:spcAft>
-              <a:defRPr sz="2200" b="1">
+          <a:p>
+            <a:pPr>
+              <a:spcAft>
+                <a:spcPts val="400"/>
+              </a:spcAft>
+              <a:defRPr sz="2000" b="1">
                 <a:solidFill>
                   <a:srgbClr val="1B3A5C"/>
                 </a:solidFill>
@@ -3534,9 +3533,9 @@
           <a:p>
             <a:pPr>
               <a:spcAft>
-                <a:spcPts val="600"/>
-              </a:spcAft>
-              <a:defRPr sz="1800" b="0">
+                <a:spcPts val="400"/>
+              </a:spcAft>
+              <a:defRPr sz="1700" b="0">
                 <a:solidFill>
                   <a:srgbClr val="000000"/>
                 </a:solidFill>
@@ -3550,9 +3549,9 @@
           <a:p>
             <a:pPr>
               <a:spcAft>
-                <a:spcPts val="600"/>
-              </a:spcAft>
-              <a:defRPr sz="1800" b="0">
+                <a:spcPts val="400"/>
+              </a:spcAft>
+              <a:defRPr sz="1700" b="0">
                 <a:solidFill>
                   <a:srgbClr val="000000"/>
                 </a:solidFill>
@@ -3566,9 +3565,9 @@
           <a:p>
             <a:pPr>
               <a:spcAft>
-                <a:spcPts val="600"/>
-              </a:spcAft>
-              <a:defRPr sz="1800" b="0">
+                <a:spcPts val="400"/>
+              </a:spcAft>
+              <a:defRPr sz="1700" b="0">
                 <a:solidFill>
                   <a:srgbClr val="000000"/>
                 </a:solidFill>
@@ -3582,9 +3581,9 @@
           <a:p>
             <a:pPr>
               <a:spcAft>
-                <a:spcPts val="600"/>
-              </a:spcAft>
-              <a:defRPr sz="1800" b="0">
+                <a:spcPts val="400"/>
+              </a:spcAft>
+              <a:defRPr sz="400" b="0">
                 <a:solidFill>
                   <a:srgbClr val="000000"/>
                 </a:solidFill>
@@ -3595,9 +3594,9 @@
           <a:p>
             <a:pPr>
               <a:spcAft>
-                <a:spcPts val="600"/>
-              </a:spcAft>
-              <a:defRPr sz="2200" b="1">
+                <a:spcPts val="400"/>
+              </a:spcAft>
+              <a:defRPr sz="2000" b="1">
                 <a:solidFill>
                   <a:srgbClr val="1B3A5C"/>
                 </a:solidFill>
@@ -3611,9 +3610,9 @@
           <a:p>
             <a:pPr>
               <a:spcAft>
-                <a:spcPts val="600"/>
-              </a:spcAft>
-              <a:defRPr sz="1800" b="0">
+                <a:spcPts val="400"/>
+              </a:spcAft>
+              <a:defRPr sz="1700" b="0">
                 <a:solidFill>
                   <a:srgbClr val="000000"/>
                 </a:solidFill>
@@ -3627,9 +3626,9 @@
           <a:p>
             <a:pPr>
               <a:spcAft>
-                <a:spcPts val="600"/>
-              </a:spcAft>
-              <a:defRPr sz="1800" b="0">
+                <a:spcPts val="400"/>
+              </a:spcAft>
+              <a:defRPr sz="1700" b="0">
                 <a:solidFill>
                   <a:srgbClr val="000000"/>
                 </a:solidFill>
@@ -3643,9 +3642,9 @@
           <a:p>
             <a:pPr>
               <a:spcAft>
-                <a:spcPts val="600"/>
-              </a:spcAft>
-              <a:defRPr sz="1800" b="0">
+                <a:spcPts val="400"/>
+              </a:spcAft>
+              <a:defRPr sz="1700" b="0">
                 <a:solidFill>
                   <a:srgbClr val="000000"/>
                 </a:solidFill>
@@ -3659,9 +3658,9 @@
           <a:p>
             <a:pPr>
               <a:spcAft>
-                <a:spcPts val="600"/>
-              </a:spcAft>
-              <a:defRPr sz="1800" b="0">
+                <a:spcPts val="400"/>
+              </a:spcAft>
+              <a:defRPr sz="400" b="0">
                 <a:solidFill>
                   <a:srgbClr val="000000"/>
                 </a:solidFill>
@@ -3672,11 +3671,11 @@
           <a:p>
             <a:pPr>
               <a:spcAft>
-                <a:spcPts val="600"/>
+                <a:spcPts val="400"/>
               </a:spcAft>
               <a:defRPr sz="2000" b="1">
                 <a:solidFill>
-                  <a:srgbClr val="2E75B6"/>
+                  <a:srgbClr val="1B3A5C"/>
                 </a:solidFill>
                 <a:latin typeface="Calibri"/>
               </a:defRPr>
@@ -3779,7 +3778,7 @@
               </a:defRPr>
             </a:pPr>
             <a:r>
-              <a:t>How Does a Robot "See"?</a:t>
+              <a:t>Hook — How Does a Robot "See"?</a:t>
             </a:r>
           </a:p>
         </p:txBody>
@@ -3793,7 +3792,7 @@
         <p:spPr>
           <a:xfrm>
             <a:off x="548640" y="1371600"/>
-            <a:ext cx="10972800" cy="5029200"/>
+            <a:ext cx="10972800" cy="365760"/>
           </a:xfrm>
           <a:prstGeom prst="rect">
             <a:avLst/>
@@ -3805,13 +3804,12 @@
             <a:spAutoFit/>
           </a:bodyPr>
           <a:lstStyle/>
-          <a:p/>
-          <a:p>
-            <a:pPr>
-              <a:spcAft>
-                <a:spcPts val="600"/>
-              </a:spcAft>
-              <a:defRPr sz="2200" b="1">
+          <a:p>
+            <a:pPr>
+              <a:spcAft>
+                <a:spcPts val="400"/>
+              </a:spcAft>
+              <a:defRPr sz="2000" b="1">
                 <a:solidFill>
                   <a:srgbClr val="1B3A5C"/>
                 </a:solidFill>
@@ -3819,31 +3817,15 @@
               </a:defRPr>
             </a:pPr>
             <a:r>
-              <a:t>Discussion Question:</a:t>
-            </a:r>
-          </a:p>
-          <a:p>
-            <a:pPr>
-              <a:spcAft>
-                <a:spcPts val="600"/>
-              </a:spcAft>
-              <a:defRPr sz="2000" b="0">
-                <a:solidFill>
-                  <a:srgbClr val="333333"/>
-                </a:solidFill>
-                <a:latin typeface="Calibri"/>
-              </a:defRPr>
-            </a:pPr>
-            <a:r>
-              <a:t>"You can see the black line. How could a robot tell the difference?"</a:t>
-            </a:r>
-          </a:p>
-          <a:p>
-            <a:pPr>
-              <a:spcAft>
-                <a:spcPts val="600"/>
-              </a:spcAft>
-              <a:defRPr sz="1800" b="0">
+              <a:t>Question: "You can see the black line. How could a robot tell the difference?"</a:t>
+            </a:r>
+          </a:p>
+          <a:p>
+            <a:pPr>
+              <a:spcAft>
+                <a:spcPts val="400"/>
+              </a:spcAft>
+              <a:defRPr sz="400" b="0">
                 <a:solidFill>
                   <a:srgbClr val="000000"/>
                 </a:solidFill>
@@ -3854,9 +3836,9 @@
           <a:p>
             <a:pPr>
               <a:spcAft>
-                <a:spcPts val="600"/>
-              </a:spcAft>
-              <a:defRPr sz="2200" b="1">
+                <a:spcPts val="400"/>
+              </a:spcAft>
+              <a:defRPr sz="2000" b="1">
                 <a:solidFill>
                   <a:srgbClr val="1B3A5C"/>
                 </a:solidFill>
@@ -3864,31 +3846,15 @@
               </a:defRPr>
             </a:pPr>
             <a:r>
-              <a:t>Key Insight:</a:t>
-            </a:r>
-          </a:p>
-          <a:p>
-            <a:pPr>
-              <a:spcAft>
-                <a:spcPts val="600"/>
-              </a:spcAft>
-              <a:defRPr sz="2000" b="0">
-                <a:solidFill>
-                  <a:srgbClr val="333333"/>
-                </a:solidFill>
-                <a:latin typeface="Calibri"/>
-              </a:defRPr>
-            </a:pPr>
-            <a:r>
-              <a:t>Robots don't have eyes — they use sensors that measure physical properties.</a:t>
-            </a:r>
-          </a:p>
-          <a:p>
-            <a:pPr>
-              <a:spcAft>
-                <a:spcPts val="600"/>
-              </a:spcAft>
-              <a:defRPr sz="1800" b="0">
+              <a:t>Discussion: Robots don't have eyes — they use sensors that measure physical properties.</a:t>
+            </a:r>
+          </a:p>
+          <a:p>
+            <a:pPr>
+              <a:spcAft>
+                <a:spcPts val="400"/>
+              </a:spcAft>
+              <a:defRPr sz="400" b="0">
                 <a:solidFill>
                   <a:srgbClr val="000000"/>
                 </a:solidFill>
@@ -3899,9 +3865,9 @@
           <a:p>
             <a:pPr>
               <a:spcAft>
-                <a:spcPts val="600"/>
-              </a:spcAft>
-              <a:defRPr sz="2200" b="1">
+                <a:spcPts val="400"/>
+              </a:spcAft>
+              <a:defRPr sz="2000" b="1">
                 <a:solidFill>
                   <a:srgbClr val="1B3A5C"/>
                 </a:solidFill>
@@ -3909,24 +3875,21 @@
               </a:defRPr>
             </a:pPr>
             <a:r>
-              <a:t>Today:</a:t>
-            </a:r>
-          </a:p>
-          <a:p>
-            <a:pPr>
-              <a:spcAft>
-                <a:spcPts val="600"/>
-              </a:spcAft>
-              <a:defRPr sz="2000" b="0">
-                <a:solidFill>
-                  <a:srgbClr val="333333"/>
-                </a:solidFill>
-                <a:latin typeface="Calibri"/>
-              </a:defRPr>
-            </a:pPr>
-            <a:r>
-              <a:t>We'll learn to read the XRP's reflectance sensors — the robot's way of "seeing" the line.</a:t>
-            </a:r>
+              <a:t>Today: We'll learn to read the XRP's reflectance sensors — the robot's way of "seeing" the line.</a:t>
+            </a:r>
+          </a:p>
+          <a:p>
+            <a:pPr>
+              <a:spcAft>
+                <a:spcPts val="400"/>
+              </a:spcAft>
+              <a:defRPr sz="400" b="0">
+                <a:solidFill>
+                  <a:srgbClr val="000000"/>
+                </a:solidFill>
+                <a:latin typeface="Calibri"/>
+              </a:defRPr>
+            </a:pPr>
           </a:p>
         </p:txBody>
       </p:sp>
@@ -4036,7 +3999,7 @@
         <p:spPr>
           <a:xfrm>
             <a:off x="548640" y="1371600"/>
-            <a:ext cx="10972800" cy="5029200"/>
+            <a:ext cx="10972800" cy="365760"/>
           </a:xfrm>
           <a:prstGeom prst="rect">
             <a:avLst/>
@@ -4048,13 +4011,12 @@
             <a:spAutoFit/>
           </a:bodyPr>
           <a:lstStyle/>
-          <a:p/>
-          <a:p>
-            <a:pPr>
-              <a:spcAft>
-                <a:spcPts val="600"/>
-              </a:spcAft>
-              <a:defRPr sz="2200" b="1">
+          <a:p>
+            <a:pPr>
+              <a:spcAft>
+                <a:spcPts val="400"/>
+              </a:spcAft>
+              <a:defRPr sz="2000" b="1">
                 <a:solidFill>
                   <a:srgbClr val="1B3A5C"/>
                 </a:solidFill>
@@ -4066,11 +4028,11 @@
             </a:r>
           </a:p>
           <a:p>
-            <a:pPr lvl="1">
-              <a:spcAft>
-                <a:spcPts val="600"/>
-              </a:spcAft>
-              <a:defRPr sz="1800" b="1">
+            <a:pPr>
+              <a:spcAft>
+                <a:spcPts val="400"/>
+              </a:spcAft>
+              <a:defRPr sz="1700" b="0">
                 <a:solidFill>
                   <a:srgbClr val="000000"/>
                 </a:solidFill>
@@ -4082,11 +4044,11 @@
             </a:r>
           </a:p>
           <a:p>
-            <a:pPr lvl="1">
-              <a:spcAft>
-                <a:spcPts val="600"/>
-              </a:spcAft>
-              <a:defRPr sz="1800" b="1">
+            <a:pPr>
+              <a:spcAft>
+                <a:spcPts val="400"/>
+              </a:spcAft>
+              <a:defRPr sz="1700" b="0">
                 <a:solidFill>
                   <a:srgbClr val="000000"/>
                 </a:solidFill>
@@ -4100,9 +4062,9 @@
           <a:p>
             <a:pPr>
               <a:spcAft>
-                <a:spcPts val="600"/>
-              </a:spcAft>
-              <a:defRPr sz="1800" b="0">
+                <a:spcPts val="400"/>
+              </a:spcAft>
+              <a:defRPr sz="400" b="0">
                 <a:solidFill>
                   <a:srgbClr val="000000"/>
                 </a:solidFill>
@@ -4113,92 +4075,105 @@
           <a:p>
             <a:pPr>
               <a:spcAft>
-                <a:spcPts val="600"/>
-              </a:spcAft>
-              <a:defRPr sz="1800" b="0">
+                <a:spcPts val="400"/>
+              </a:spcAft>
+              <a:defRPr sz="2000" b="1">
+                <a:solidFill>
+                  <a:srgbClr val="1B3A5C"/>
+                </a:solidFill>
+                <a:latin typeface="Calibri"/>
+              </a:defRPr>
+            </a:pPr>
+            <a:r>
+              <a:t>White surface: Reflects most light → low value (close to 0.0)</a:t>
+            </a:r>
+          </a:p>
+          <a:p>
+            <a:pPr>
+              <a:spcAft>
+                <a:spcPts val="400"/>
+              </a:spcAft>
+              <a:defRPr sz="2000" b="1">
+                <a:solidFill>
+                  <a:srgbClr val="1B3A5C"/>
+                </a:solidFill>
+                <a:latin typeface="Calibri"/>
+              </a:defRPr>
+            </a:pPr>
+            <a:r>
+              <a:t>Black surface: Absorbs most light → high value (close to 1.0)</a:t>
+            </a:r>
+          </a:p>
+          <a:p>
+            <a:pPr>
+              <a:spcAft>
+                <a:spcPts val="400"/>
+              </a:spcAft>
+              <a:defRPr sz="400" b="0">
                 <a:solidFill>
                   <a:srgbClr val="000000"/>
                 </a:solidFill>
                 <a:latin typeface="Calibri"/>
               </a:defRPr>
             </a:pPr>
-            <a:r>
-              <a:t>White surface: Reflects most light → low value (close to 0.0)</a:t>
-            </a:r>
-          </a:p>
-          <a:p>
-            <a:pPr>
-              <a:spcAft>
-                <a:spcPts val="600"/>
-              </a:spcAft>
-              <a:defRPr sz="1800" b="0">
+          </a:p>
+          <a:p>
+            <a:pPr>
+              <a:spcAft>
+                <a:spcPts val="400"/>
+              </a:spcAft>
+              <a:defRPr sz="2000" b="1">
+                <a:solidFill>
+                  <a:srgbClr val="1B3A5C"/>
+                </a:solidFill>
+                <a:latin typeface="Calibri"/>
+              </a:defRPr>
+            </a:pPr>
+            <a:r>
+              <a:t>Analogy: Flashlight on a mirror vs. a black t-shirt</a:t>
+            </a:r>
+          </a:p>
+          <a:p>
+            <a:pPr>
+              <a:spcAft>
+                <a:spcPts val="400"/>
+              </a:spcAft>
+              <a:defRPr sz="400" b="0">
                 <a:solidFill>
                   <a:srgbClr val="000000"/>
                 </a:solidFill>
                 <a:latin typeface="Calibri"/>
               </a:defRPr>
             </a:pPr>
-            <a:r>
-              <a:t>Black surface: Absorbs most light → high value (close to 1.0)</a:t>
-            </a:r>
-          </a:p>
-          <a:p>
-            <a:pPr>
-              <a:spcAft>
-                <a:spcPts val="600"/>
-              </a:spcAft>
-              <a:defRPr sz="1800" b="0">
+          </a:p>
+          <a:p>
+            <a:pPr>
+              <a:spcAft>
+                <a:spcPts val="400"/>
+              </a:spcAft>
+              <a:defRPr sz="2000" b="1">
+                <a:solidFill>
+                  <a:srgbClr val="1B3A5C"/>
+                </a:solidFill>
+                <a:latin typeface="Calibri"/>
+              </a:defRPr>
+            </a:pPr>
+            <a:r>
+              <a:t>Show: Photo of XRP underside with sensors highlighted</a:t>
+            </a:r>
+          </a:p>
+          <a:p>
+            <a:pPr>
+              <a:spcAft>
+                <a:spcPts val="400"/>
+              </a:spcAft>
+              <a:defRPr sz="400" b="0">
                 <a:solidFill>
                   <a:srgbClr val="000000"/>
                 </a:solidFill>
                 <a:latin typeface="Calibri"/>
               </a:defRPr>
             </a:pPr>
-          </a:p>
-          <a:p>
-            <a:pPr>
-              <a:spcAft>
-                <a:spcPts val="600"/>
-              </a:spcAft>
-              <a:defRPr sz="1800" b="1">
-                <a:solidFill>
-                  <a:srgbClr val="2E75B6"/>
-                </a:solidFill>
-                <a:latin typeface="Calibri"/>
-              </a:defRPr>
-            </a:pPr>
-            <a:r>
-              <a:t>Analogy: Flashlight on a mirror vs. a black t-shirt</a:t>
-            </a:r>
-          </a:p>
-          <a:p>
-            <a:pPr>
-              <a:spcAft>
-                <a:spcPts val="600"/>
-              </a:spcAft>
-              <a:defRPr sz="1800" b="0">
-                <a:solidFill>
-                  <a:srgbClr val="000000"/>
-                </a:solidFill>
-                <a:latin typeface="Calibri"/>
-              </a:defRPr>
-            </a:pPr>
-          </a:p>
-          <a:p>
-            <a:pPr>
-              <a:spcAft>
-                <a:spcPts val="600"/>
-              </a:spcAft>
-              <a:defRPr sz="1600" b="0">
-                <a:solidFill>
-                  <a:srgbClr val="999999"/>
-                </a:solidFill>
-                <a:latin typeface="Calibri"/>
-              </a:defRPr>
-            </a:pPr>
-            <a:r>
-              <a:t>Show: Photo of XRP underside with sensors highlighted</a:t>
-            </a:r>
           </a:p>
         </p:txBody>
       </p:sp>
@@ -4308,7 +4283,7 @@
         <p:spPr>
           <a:xfrm>
             <a:off x="548640" y="1371600"/>
-            <a:ext cx="10972800" cy="731520"/>
+            <a:ext cx="10972800" cy="365760"/>
           </a:xfrm>
           <a:prstGeom prst="rect">
             <a:avLst/>
@@ -4322,7 +4297,10 @@
           <a:lstStyle/>
           <a:p>
             <a:pPr>
-              <a:defRPr sz="2000" b="1">
+              <a:spcAft>
+                <a:spcPts val="400"/>
+              </a:spcAft>
+              <a:defRPr sz="1800" b="1">
                 <a:solidFill>
                   <a:srgbClr val="1B3A5C"/>
                 </a:solidFill>
@@ -4332,6 +4310,19 @@
             <a:r>
               <a:t>Values range from 0.0 to 1.0:</a:t>
             </a:r>
+          </a:p>
+          <a:p>
+            <a:pPr>
+              <a:spcAft>
+                <a:spcPts val="400"/>
+              </a:spcAft>
+              <a:defRPr sz="400" b="0">
+                <a:solidFill>
+                  <a:srgbClr val="000000"/>
+                </a:solidFill>
+                <a:latin typeface="Calibri"/>
+              </a:defRPr>
+            </a:pPr>
           </a:p>
         </p:txBody>
       </p:sp>
@@ -4344,8 +4335,8 @@
           <p:nvPr/>
         </p:nvGraphicFramePr>
         <p:xfrm>
-          <a:off x="1371600" y="2286000"/>
-          <a:ext cx="9144000" cy="1645920"/>
+          <a:off x="914400" y="1371600"/>
+          <a:ext cx="10058400" cy="1463040"/>
         </p:xfrm>
         <a:graphic>
           <a:graphicData uri="http://schemas.openxmlformats.org/drawingml/2006/table">
@@ -4354,18 +4345,18 @@
                 <a:tableStyleId>{5C22544A-7EE6-4342-B048-85BDC9FD1C3A}</a:tableStyleId>
               </a:tblPr>
               <a:tblGrid>
-                <a:gridCol w="3048000"/>
-                <a:gridCol w="3048000"/>
-                <a:gridCol w="3048000"/>
+                <a:gridCol w="3352800"/>
+                <a:gridCol w="3352800"/>
+                <a:gridCol w="3352800"/>
               </a:tblGrid>
-              <a:tr h="411480">
+              <a:tr h="365760">
                 <a:tc>
                   <a:txBody>
                     <a:bodyPr/>
                     <a:lstStyle/>
                     <a:p>
                       <a:pPr algn="ctr">
-                        <a:defRPr sz="1600" b="1">
+                        <a:defRPr sz="1400" b="1">
                           <a:solidFill>
                             <a:srgbClr val="FFFFFF"/>
                           </a:solidFill>
@@ -4389,7 +4380,7 @@
                     <a:lstStyle/>
                     <a:p>
                       <a:pPr algn="ctr">
-                        <a:defRPr sz="1600" b="1">
+                        <a:defRPr sz="1400" b="1">
                           <a:solidFill>
                             <a:srgbClr val="FFFFFF"/>
                           </a:solidFill>
@@ -4413,7 +4404,7 @@
                     <a:lstStyle/>
                     <a:p>
                       <a:pPr algn="ctr">
-                        <a:defRPr sz="1600" b="1">
+                        <a:defRPr sz="1400" b="1">
                           <a:solidFill>
                             <a:srgbClr val="FFFFFF"/>
                           </a:solidFill>
@@ -4432,14 +4423,14 @@
                   </a:tcPr>
                 </a:tc>
               </a:tr>
-              <a:tr h="411480">
+              <a:tr h="365760">
                 <a:tc>
                   <a:txBody>
                     <a:bodyPr/>
                     <a:lstStyle/>
                     <a:p>
                       <a:pPr algn="ctr">
-                        <a:defRPr sz="1400">
+                        <a:defRPr sz="1300">
                           <a:latin typeface="Calibri"/>
                         </a:defRPr>
                       </a:pPr>
@@ -4456,7 +4447,7 @@
                     <a:lstStyle/>
                     <a:p>
                       <a:pPr algn="ctr">
-                        <a:defRPr sz="1400">
+                        <a:defRPr sz="1300">
                           <a:latin typeface="Calibri"/>
                         </a:defRPr>
                       </a:pPr>
@@ -4473,7 +4464,7 @@
                     <a:lstStyle/>
                     <a:p>
                       <a:pPr algn="ctr">
-                        <a:defRPr sz="1400">
+                        <a:defRPr sz="1300">
                           <a:latin typeface="Calibri"/>
                         </a:defRPr>
                       </a:pPr>
@@ -4485,14 +4476,14 @@
                   <a:tcPr/>
                 </a:tc>
               </a:tr>
-              <a:tr h="411480">
+              <a:tr h="365760">
                 <a:tc>
                   <a:txBody>
                     <a:bodyPr/>
                     <a:lstStyle/>
                     <a:p>
                       <a:pPr algn="ctr">
-                        <a:defRPr sz="1400">
+                        <a:defRPr sz="1300">
                           <a:latin typeface="Calibri"/>
                         </a:defRPr>
                       </a:pPr>
@@ -4513,7 +4504,7 @@
                     <a:lstStyle/>
                     <a:p>
                       <a:pPr algn="ctr">
-                        <a:defRPr sz="1400">
+                        <a:defRPr sz="1300">
                           <a:latin typeface="Calibri"/>
                         </a:defRPr>
                       </a:pPr>
@@ -4534,7 +4525,7 @@
                     <a:lstStyle/>
                     <a:p>
                       <a:pPr algn="ctr">
-                        <a:defRPr sz="1400">
+                        <a:defRPr sz="1300">
                           <a:latin typeface="Calibri"/>
                         </a:defRPr>
                       </a:pPr>
@@ -4550,14 +4541,14 @@
                   </a:tcPr>
                 </a:tc>
               </a:tr>
-              <a:tr h="411480">
+              <a:tr h="365760">
                 <a:tc>
                   <a:txBody>
                     <a:bodyPr/>
                     <a:lstStyle/>
                     <a:p>
                       <a:pPr algn="ctr">
-                        <a:defRPr sz="1400">
+                        <a:defRPr sz="1300">
                           <a:latin typeface="Calibri"/>
                         </a:defRPr>
                       </a:pPr>
@@ -4574,7 +4565,7 @@
                     <a:lstStyle/>
                     <a:p>
                       <a:pPr algn="ctr">
-                        <a:defRPr sz="1400">
+                        <a:defRPr sz="1300">
                           <a:latin typeface="Calibri"/>
                         </a:defRPr>
                       </a:pPr>
@@ -4591,7 +4582,7 @@
                     <a:lstStyle/>
                     <a:p>
                       <a:pPr algn="ctr">
-                        <a:defRPr sz="1400">
+                        <a:defRPr sz="1300">
                           <a:latin typeface="Calibri"/>
                         </a:defRPr>
                       </a:pPr>
@@ -4615,8 +4606,8 @@
         </p:nvSpPr>
         <p:spPr>
           <a:xfrm>
-            <a:off x="548640" y="4389120"/>
-            <a:ext cx="10972800" cy="1828800"/>
+            <a:off x="548640" y="3017520"/>
+            <a:ext cx="10972800" cy="365760"/>
           </a:xfrm>
           <a:prstGeom prst="rect">
             <a:avLst/>
@@ -4628,13 +4619,12 @@
             <a:spAutoFit/>
           </a:bodyPr>
           <a:lstStyle/>
-          <a:p/>
-          <a:p>
-            <a:pPr>
-              <a:spcAft>
-                <a:spcPts val="600"/>
-              </a:spcAft>
-              <a:defRPr sz="2000" b="1">
+          <a:p>
+            <a:pPr>
+              <a:spcAft>
+                <a:spcPts val="400"/>
+              </a:spcAft>
+              <a:defRPr sz="1800" b="1">
                 <a:solidFill>
                   <a:srgbClr val="1B3A5C"/>
                 </a:solidFill>
@@ -4648,18 +4638,44 @@
           <a:p>
             <a:pPr>
               <a:spcAft>
-                <a:spcPts val="600"/>
-              </a:spcAft>
-              <a:defRPr sz="1800" b="0">
+                <a:spcPts val="400"/>
+              </a:spcAft>
+              <a:defRPr sz="400" b="0">
                 <a:solidFill>
                   <a:srgbClr val="000000"/>
                 </a:solidFill>
                 <a:latin typeface="Calibri"/>
               </a:defRPr>
             </a:pPr>
+          </a:p>
+          <a:p>
+            <a:pPr>
+              <a:spcAft>
+                <a:spcPts val="400"/>
+              </a:spcAft>
+              <a:defRPr sz="1600" b="0">
+                <a:solidFill>
+                  <a:srgbClr val="000000"/>
+                </a:solidFill>
+                <a:latin typeface="Calibri"/>
+              </a:defRPr>
+            </a:pPr>
             <a:r>
               <a:t>The XRP has TWO sensors — left and right — each reads independently.</a:t>
             </a:r>
+          </a:p>
+          <a:p>
+            <a:pPr>
+              <a:spcAft>
+                <a:spcPts val="400"/>
+              </a:spcAft>
+              <a:defRPr sz="400" b="0">
+                <a:solidFill>
+                  <a:srgbClr val="000000"/>
+                </a:solidFill>
+                <a:latin typeface="Calibri"/>
+              </a:defRPr>
+            </a:pPr>
           </a:p>
         </p:txBody>
       </p:sp>
@@ -4769,7 +4785,7 @@
         <p:spPr>
           <a:xfrm>
             <a:off x="548640" y="1371600"/>
-            <a:ext cx="5029200" cy="457200"/>
+            <a:ext cx="10972800" cy="365760"/>
           </a:xfrm>
           <a:prstGeom prst="rect">
             <a:avLst/>
@@ -4777,7 +4793,7 @@
           <a:noFill/>
         </p:spPr>
         <p:txBody>
-          <a:bodyPr wrap="none">
+          <a:bodyPr wrap="square">
             <a:spAutoFit/>
           </a:bodyPr>
           <a:lstStyle/>
@@ -4798,14 +4814,86 @@
       </p:sp>
       <p:sp>
         <p:nvSpPr>
-          <p:cNvPr id="5" name="Rounded Rectangle 4"/>
-          <p:cNvSpPr/>
+          <p:cNvPr id="5" name="TextBox 4"/>
+          <p:cNvSpPr txBox="1"/>
+          <p:nvPr/>
+        </p:nvSpPr>
+        <p:spPr>
+          <a:xfrm>
+            <a:off x="548640" y="1645920"/>
+            <a:ext cx="10972800" cy="365760"/>
+          </a:xfrm>
+          <a:prstGeom prst="rect">
+            <a:avLst/>
+          </a:prstGeom>
+          <a:noFill/>
+        </p:spPr>
+        <p:txBody>
+          <a:bodyPr wrap="square">
+            <a:spAutoFit/>
+          </a:bodyPr>
+          <a:lstStyle/>
+          <a:p>
+            <a:pPr>
+              <a:defRPr sz="1800" b="1">
+                <a:solidFill>
+                  <a:srgbClr val="1B3A5C"/>
+                </a:solidFill>
+                <a:latin typeface="Calibri"/>
+              </a:defRPr>
+            </a:pPr>
+            <a:r>
+              <a:t>Read values:</a:t>
+            </a:r>
+          </a:p>
+        </p:txBody>
+      </p:sp>
+      <p:sp>
+        <p:nvSpPr>
+          <p:cNvPr id="6" name="TextBox 5"/>
+          <p:cNvSpPr txBox="1"/>
           <p:nvPr/>
         </p:nvSpPr>
         <p:spPr>
           <a:xfrm>
             <a:off x="548640" y="1920240"/>
-            <a:ext cx="5029200" cy="1828800"/>
+            <a:ext cx="10972800" cy="365760"/>
+          </a:xfrm>
+          <a:prstGeom prst="rect">
+            <a:avLst/>
+          </a:prstGeom>
+          <a:noFill/>
+        </p:spPr>
+        <p:txBody>
+          <a:bodyPr wrap="square">
+            <a:spAutoFit/>
+          </a:bodyPr>
+          <a:lstStyle/>
+          <a:p>
+            <a:pPr>
+              <a:defRPr sz="1800" b="1">
+                <a:solidFill>
+                  <a:srgbClr val="1B3A5C"/>
+                </a:solidFill>
+                <a:latin typeface="Calibri"/>
+              </a:defRPr>
+            </a:pPr>
+            <a:r>
+              <a:t>Key point: get_left() and get_right() return a number between 0.0 and 1.0.</a:t>
+            </a:r>
+          </a:p>
+        </p:txBody>
+      </p:sp>
+      <p:sp>
+        <p:nvSpPr>
+          <p:cNvPr id="7" name="Rounded Rectangle 6"/>
+          <p:cNvSpPr/>
+          <p:nvPr/>
+        </p:nvSpPr>
+        <p:spPr>
+          <a:xfrm>
+            <a:off x="548640" y="2194560"/>
+            <a:ext cx="5303520" cy="1417320"/>
           </a:xfrm>
           <a:prstGeom prst="roundRect">
             <a:avLst/>
@@ -4843,14 +4931,14 @@
       </p:sp>
       <p:sp>
         <p:nvSpPr>
-          <p:cNvPr id="6" name="TextBox 5"/>
+          <p:cNvPr id="8" name="TextBox 7"/>
           <p:cNvSpPr txBox="1"/>
           <p:nvPr/>
         </p:nvSpPr>
         <p:spPr>
           <a:xfrm>
-            <a:off x="731520" y="2057400"/>
-            <a:ext cx="4663440" cy="1554480"/>
+            <a:off x="731520" y="2286000"/>
+            <a:ext cx="4937760" cy="1234440"/>
           </a:xfrm>
           <a:prstGeom prst="rect">
             <a:avLst/>
@@ -4865,9 +4953,9 @@
           <a:p>
             <a:pPr>
               <a:spcAft>
-                <a:spcPts val="200"/>
-              </a:spcAft>
-              <a:defRPr sz="1400">
+                <a:spcPts val="100"/>
+              </a:spcAft>
+              <a:defRPr sz="1300">
                 <a:solidFill>
                   <a:srgbClr val="333333"/>
                 </a:solidFill>
@@ -4881,9 +4969,9 @@
           <a:p>
             <a:pPr>
               <a:spcAft>
-                <a:spcPts val="200"/>
-              </a:spcAft>
-              <a:defRPr sz="1400">
+                <a:spcPts val="100"/>
+              </a:spcAft>
+              <a:defRPr sz="1300">
                 <a:solidFill>
                   <a:srgbClr val="333333"/>
                 </a:solidFill>
@@ -4897,9 +4985,9 @@
           <a:p>
             <a:pPr>
               <a:spcAft>
-                <a:spcPts val="200"/>
-              </a:spcAft>
-              <a:defRPr sz="1400">
+                <a:spcPts val="100"/>
+              </a:spcAft>
+              <a:defRPr sz="1300">
                 <a:solidFill>
                   <a:srgbClr val="333333"/>
                 </a:solidFill>
@@ -4910,9 +4998,9 @@
           <a:p>
             <a:pPr>
               <a:spcAft>
-                <a:spcPts val="200"/>
-              </a:spcAft>
-              <a:defRPr sz="1400">
+                <a:spcPts val="100"/>
+              </a:spcAft>
+              <a:defRPr sz="1300">
                 <a:solidFill>
                   <a:srgbClr val="333333"/>
                 </a:solidFill>
@@ -4926,9 +5014,9 @@
           <a:p>
             <a:pPr>
               <a:spcAft>
-                <a:spcPts val="200"/>
-              </a:spcAft>
-              <a:defRPr sz="1400">
+                <a:spcPts val="100"/>
+              </a:spcAft>
+              <a:defRPr sz="1300">
                 <a:solidFill>
                   <a:srgbClr val="333333"/>
                 </a:solidFill>
@@ -4943,50 +5031,14 @@
       </p:sp>
       <p:sp>
         <p:nvSpPr>
-          <p:cNvPr id="7" name="TextBox 6"/>
-          <p:cNvSpPr txBox="1"/>
+          <p:cNvPr id="9" name="Rounded Rectangle 8"/>
+          <p:cNvSpPr/>
           <p:nvPr/>
         </p:nvSpPr>
         <p:spPr>
           <a:xfrm>
-            <a:off x="6400800" y="1371600"/>
-            <a:ext cx="5029200" cy="457200"/>
-          </a:xfrm>
-          <a:prstGeom prst="rect">
-            <a:avLst/>
-          </a:prstGeom>
-          <a:noFill/>
-        </p:spPr>
-        <p:txBody>
-          <a:bodyPr wrap="none">
-            <a:spAutoFit/>
-          </a:bodyPr>
-          <a:lstStyle/>
-          <a:p>
-            <a:pPr>
-              <a:defRPr sz="1800" b="1">
-                <a:solidFill>
-                  <a:srgbClr val="1B3A5C"/>
-                </a:solidFill>
-                <a:latin typeface="Calibri"/>
-              </a:defRPr>
-            </a:pPr>
-            <a:r>
-              <a:t>Read values:</a:t>
-            </a:r>
-          </a:p>
-        </p:txBody>
-      </p:sp>
-      <p:sp>
-        <p:nvSpPr>
-          <p:cNvPr id="8" name="Rounded Rectangle 7"/>
-          <p:cNvSpPr/>
-          <p:nvPr/>
-        </p:nvSpPr>
-        <p:spPr>
-          <a:xfrm>
-            <a:off x="6400800" y="1920240"/>
-            <a:ext cx="5029200" cy="1554480"/>
+            <a:off x="6217920" y="2194560"/>
+            <a:ext cx="5303520" cy="1417320"/>
           </a:xfrm>
           <a:prstGeom prst="roundRect">
             <a:avLst/>
@@ -5024,14 +5076,14 @@
       </p:sp>
       <p:sp>
         <p:nvSpPr>
-          <p:cNvPr id="9" name="TextBox 8"/>
+          <p:cNvPr id="10" name="TextBox 9"/>
           <p:cNvSpPr txBox="1"/>
           <p:nvPr/>
         </p:nvSpPr>
         <p:spPr>
           <a:xfrm>
-            <a:off x="6583680" y="2057400"/>
-            <a:ext cx="4663440" cy="1280160"/>
+            <a:off x="6400800" y="2286000"/>
+            <a:ext cx="4937760" cy="1234440"/>
           </a:xfrm>
           <a:prstGeom prst="rect">
             <a:avLst/>
@@ -5046,9 +5098,9 @@
           <a:p>
             <a:pPr>
               <a:spcAft>
-                <a:spcPts val="200"/>
-              </a:spcAft>
-              <a:defRPr sz="1400">
+                <a:spcPts val="100"/>
+              </a:spcAft>
+              <a:defRPr sz="1300">
                 <a:solidFill>
                   <a:srgbClr val="333333"/>
                 </a:solidFill>
@@ -5062,9 +5114,9 @@
           <a:p>
             <a:pPr>
               <a:spcAft>
-                <a:spcPts val="200"/>
-              </a:spcAft>
-              <a:defRPr sz="1400">
+                <a:spcPts val="100"/>
+              </a:spcAft>
+              <a:defRPr sz="1300">
                 <a:solidFill>
                   <a:srgbClr val="333333"/>
                 </a:solidFill>
@@ -5078,9 +5130,9 @@
           <a:p>
             <a:pPr>
               <a:spcAft>
-                <a:spcPts val="200"/>
-              </a:spcAft>
-              <a:defRPr sz="1400">
+                <a:spcPts val="100"/>
+              </a:spcAft>
+              <a:defRPr sz="1300">
                 <a:solidFill>
                   <a:srgbClr val="333333"/>
                 </a:solidFill>
@@ -5094,9 +5146,9 @@
           <a:p>
             <a:pPr>
               <a:spcAft>
-                <a:spcPts val="200"/>
-              </a:spcAft>
-              <a:defRPr sz="1400">
+                <a:spcPts val="100"/>
+              </a:spcAft>
+              <a:defRPr sz="1300">
                 <a:solidFill>
                   <a:srgbClr val="333333"/>
                 </a:solidFill>
@@ -5105,42 +5157,6 @@
             </a:pPr>
             <a:r>
               <a:t>print("Left:", left, "Right:", right)</a:t>
-            </a:r>
-          </a:p>
-        </p:txBody>
-      </p:sp>
-      <p:sp>
-        <p:nvSpPr>
-          <p:cNvPr id="10" name="TextBox 9"/>
-          <p:cNvSpPr txBox="1"/>
-          <p:nvPr/>
-        </p:nvSpPr>
-        <p:spPr>
-          <a:xfrm>
-            <a:off x="548640" y="4572000"/>
-            <a:ext cx="10972800" cy="914400"/>
-          </a:xfrm>
-          <a:prstGeom prst="rect">
-            <a:avLst/>
-          </a:prstGeom>
-          <a:noFill/>
-        </p:spPr>
-        <p:txBody>
-          <a:bodyPr wrap="square">
-            <a:spAutoFit/>
-          </a:bodyPr>
-          <a:lstStyle/>
-          <a:p>
-            <a:pPr>
-              <a:defRPr sz="2000" b="1">
-                <a:solidFill>
-                  <a:srgbClr val="2E75B6"/>
-                </a:solidFill>
-                <a:latin typeface="Calibri"/>
-              </a:defRPr>
-            </a:pPr>
-            <a:r>
-              <a:t>Key point: get_left() and get_right() return a number between 0.0 and 1.0.</a:t>
             </a:r>
           </a:p>
         </p:txBody>
@@ -5251,7 +5267,7 @@
         <p:spPr>
           <a:xfrm>
             <a:off x="548640" y="1371600"/>
-            <a:ext cx="5486400" cy="457200"/>
+            <a:ext cx="10972800" cy="365760"/>
           </a:xfrm>
           <a:prstGeom prst="rect">
             <a:avLst/>
@@ -5259,13 +5275,16 @@
           <a:noFill/>
         </p:spPr>
         <p:txBody>
-          <a:bodyPr wrap="none">
+          <a:bodyPr wrap="square">
             <a:spAutoFit/>
           </a:bodyPr>
           <a:lstStyle/>
           <a:p>
             <a:pPr>
-              <a:defRPr sz="1800" b="1">
+              <a:spcAft>
+                <a:spcPts val="400"/>
+              </a:spcAft>
+              <a:defRPr sz="2000" b="1">
                 <a:solidFill>
                   <a:srgbClr val="1B3A5C"/>
                 </a:solidFill>
@@ -5286,8 +5305,8 @@
         </p:nvSpPr>
         <p:spPr>
           <a:xfrm>
-            <a:off x="548640" y="1920240"/>
-            <a:ext cx="5486400" cy="2743200"/>
+            <a:off x="548640" y="1371600"/>
+            <a:ext cx="10972800" cy="2331720"/>
           </a:xfrm>
           <a:prstGeom prst="roundRect">
             <a:avLst/>
@@ -5331,8 +5350,8 @@
         </p:nvSpPr>
         <p:spPr>
           <a:xfrm>
-            <a:off x="731520" y="2057400"/>
-            <a:ext cx="5120640" cy="2468880"/>
+            <a:off x="731520" y="1463040"/>
+            <a:ext cx="10607040" cy="2148840"/>
           </a:xfrm>
           <a:prstGeom prst="rect">
             <a:avLst/>
@@ -5347,9 +5366,9 @@
           <a:p>
             <a:pPr>
               <a:spcAft>
-                <a:spcPts val="200"/>
-              </a:spcAft>
-              <a:defRPr sz="1400">
+                <a:spcPts val="100"/>
+              </a:spcAft>
+              <a:defRPr sz="1300">
                 <a:solidFill>
                   <a:srgbClr val="333333"/>
                 </a:solidFill>
@@ -5363,9 +5382,9 @@
           <a:p>
             <a:pPr>
               <a:spcAft>
-                <a:spcPts val="200"/>
-              </a:spcAft>
-              <a:defRPr sz="1400">
+                <a:spcPts val="100"/>
+              </a:spcAft>
+              <a:defRPr sz="1300">
                 <a:solidFill>
                   <a:srgbClr val="333333"/>
                 </a:solidFill>
@@ -5376,9 +5395,9 @@
           <a:p>
             <a:pPr>
               <a:spcAft>
-                <a:spcPts val="200"/>
-              </a:spcAft>
-              <a:defRPr sz="1400">
+                <a:spcPts val="100"/>
+              </a:spcAft>
+              <a:defRPr sz="1300">
                 <a:solidFill>
                   <a:srgbClr val="333333"/>
                 </a:solidFill>
@@ -5392,9 +5411,9 @@
           <a:p>
             <a:pPr>
               <a:spcAft>
-                <a:spcPts val="200"/>
-              </a:spcAft>
-              <a:defRPr sz="1400">
+                <a:spcPts val="100"/>
+              </a:spcAft>
+              <a:defRPr sz="1300">
                 <a:solidFill>
                   <a:srgbClr val="333333"/>
                 </a:solidFill>
@@ -5405,9 +5424,9 @@
           <a:p>
             <a:pPr>
               <a:spcAft>
-                <a:spcPts val="200"/>
-              </a:spcAft>
-              <a:defRPr sz="1400">
+                <a:spcPts val="100"/>
+              </a:spcAft>
+              <a:defRPr sz="1300">
                 <a:solidFill>
                   <a:srgbClr val="333333"/>
                 </a:solidFill>
@@ -5421,9 +5440,9 @@
           <a:p>
             <a:pPr>
               <a:spcAft>
-                <a:spcPts val="200"/>
-              </a:spcAft>
-              <a:defRPr sz="1400">
+                <a:spcPts val="100"/>
+              </a:spcAft>
+              <a:defRPr sz="1300">
                 <a:solidFill>
                   <a:srgbClr val="333333"/>
                 </a:solidFill>
@@ -5437,9 +5456,9 @@
           <a:p>
             <a:pPr>
               <a:spcAft>
-                <a:spcPts val="200"/>
-              </a:spcAft>
-              <a:defRPr sz="1400">
+                <a:spcPts val="100"/>
+              </a:spcAft>
+              <a:defRPr sz="1300">
                 <a:solidFill>
                   <a:srgbClr val="333333"/>
                 </a:solidFill>
@@ -5453,9 +5472,9 @@
           <a:p>
             <a:pPr>
               <a:spcAft>
-                <a:spcPts val="200"/>
-              </a:spcAft>
-              <a:defRPr sz="1400">
+                <a:spcPts val="100"/>
+              </a:spcAft>
+              <a:defRPr sz="1300">
                 <a:solidFill>
                   <a:srgbClr val="333333"/>
                 </a:solidFill>
@@ -5469,9 +5488,9 @@
           <a:p>
             <a:pPr>
               <a:spcAft>
-                <a:spcPts val="200"/>
-              </a:spcAft>
-              <a:defRPr sz="1400">
+                <a:spcPts val="100"/>
+              </a:spcAft>
+              <a:defRPr sz="1300">
                 <a:solidFill>
                   <a:srgbClr val="333333"/>
                 </a:solidFill>
@@ -5492,8 +5511,8 @@
         </p:nvSpPr>
         <p:spPr>
           <a:xfrm>
-            <a:off x="6858000" y="1920240"/>
-            <a:ext cx="4572000" cy="2743200"/>
+            <a:off x="548640" y="3840480"/>
+            <a:ext cx="10972800" cy="365760"/>
           </a:xfrm>
           <a:prstGeom prst="rect">
             <a:avLst/>
@@ -5505,29 +5524,12 @@
             <a:spAutoFit/>
           </a:bodyPr>
           <a:lstStyle/>
-          <a:p/>
-          <a:p>
-            <a:pPr>
-              <a:spcAft>
-                <a:spcPts val="600"/>
-              </a:spcAft>
-              <a:defRPr sz="2000" b="1">
-                <a:solidFill>
-                  <a:srgbClr val="1B3A5C"/>
-                </a:solidFill>
-                <a:latin typeface="Calibri"/>
-              </a:defRPr>
-            </a:pPr>
-            <a:r>
-              <a:t>Why?</a:t>
-            </a:r>
-          </a:p>
-          <a:p>
-            <a:pPr>
-              <a:spcAft>
-                <a:spcPts val="600"/>
-              </a:spcAft>
-              <a:defRPr sz="1800" b="0">
+          <a:p>
+            <a:pPr>
+              <a:spcAft>
+                <a:spcPts val="400"/>
+              </a:spcAft>
+              <a:defRPr sz="1700" b="0">
                 <a:solidFill>
                   <a:srgbClr val="000000"/>
                 </a:solidFill>
@@ -5535,15 +5537,15 @@
               </a:defRPr>
             </a:pPr>
             <a:r>
-              <a:t>See how values change as you move the robot across the line.</a:t>
-            </a:r>
-          </a:p>
-          <a:p>
-            <a:pPr>
-              <a:spcAft>
-                <a:spcPts val="600"/>
-              </a:spcAft>
-              <a:defRPr sz="1800" b="0">
+              <a:t>Why? See how values change as you move the robot across the line.</a:t>
+            </a:r>
+          </a:p>
+          <a:p>
+            <a:pPr>
+              <a:spcAft>
+                <a:spcPts val="400"/>
+              </a:spcAft>
+              <a:defRPr sz="400" b="0">
                 <a:solidFill>
                   <a:srgbClr val="000000"/>
                 </a:solidFill>
@@ -5554,25 +5556,9 @@
           <a:p>
             <a:pPr>
               <a:spcAft>
-                <a:spcPts val="600"/>
-              </a:spcAft>
-              <a:defRPr sz="1800" b="1">
-                <a:solidFill>
-                  <a:srgbClr val="2E75B6"/>
-                </a:solidFill>
-                <a:latin typeface="Calibri"/>
-              </a:defRPr>
-            </a:pPr>
-            <a:r>
-              <a:t>time.sleep(0.1)</a:t>
-            </a:r>
-          </a:p>
-          <a:p>
-            <a:pPr>
-              <a:spcAft>
-                <a:spcPts val="600"/>
-              </a:spcAft>
-              <a:defRPr sz="1800" b="0">
+                <a:spcPts val="400"/>
+              </a:spcAft>
+              <a:defRPr sz="1700" b="0">
                 <a:solidFill>
                   <a:srgbClr val="000000"/>
                 </a:solidFill>
@@ -5580,8 +5566,21 @@
               </a:defRPr>
             </a:pPr>
             <a:r>
-              <a:t>Pause 0.1 seconds so readings aren't too fast to read.</a:t>
-            </a:r>
+              <a:t>time.sleep(0.1) — pause 0.1 seconds so readings aren't too fast to read.</a:t>
+            </a:r>
+          </a:p>
+          <a:p>
+            <a:pPr>
+              <a:spcAft>
+                <a:spcPts val="400"/>
+              </a:spcAft>
+              <a:defRPr sz="400" b="0">
+                <a:solidFill>
+                  <a:srgbClr val="000000"/>
+                </a:solidFill>
+                <a:latin typeface="Calibri"/>
+              </a:defRPr>
+            </a:pPr>
           </a:p>
         </p:txBody>
       </p:sp>
@@ -5691,7 +5690,7 @@
         <p:spPr>
           <a:xfrm>
             <a:off x="548640" y="1371600"/>
-            <a:ext cx="10972800" cy="5029200"/>
+            <a:ext cx="10972800" cy="365760"/>
           </a:xfrm>
           <a:prstGeom prst="rect">
             <a:avLst/>
@@ -5703,13 +5702,12 @@
             <a:spAutoFit/>
           </a:bodyPr>
           <a:lstStyle/>
-          <a:p/>
-          <a:p>
-            <a:pPr>
-              <a:spcAft>
-                <a:spcPts val="600"/>
-              </a:spcAft>
-              <a:defRPr sz="2200" b="1">
+          <a:p>
+            <a:pPr>
+              <a:spcAft>
+                <a:spcPts val="400"/>
+              </a:spcAft>
+              <a:defRPr sz="2000" b="1">
                 <a:solidFill>
                   <a:srgbClr val="1B3A5C"/>
                 </a:solidFill>
@@ -5723,9 +5721,9 @@
           <a:p>
             <a:pPr>
               <a:spcAft>
-                <a:spcPts val="600"/>
-              </a:spcAft>
-              <a:defRPr sz="1800" b="0">
+                <a:spcPts val="400"/>
+              </a:spcAft>
+              <a:defRPr sz="400" b="0">
                 <a:solidFill>
                   <a:srgbClr val="000000"/>
                 </a:solidFill>
@@ -5736,7 +5734,7 @@
           <a:p>
             <a:pPr>
               <a:spcAft>
-                <a:spcPts val="600"/>
+                <a:spcPts val="400"/>
               </a:spcAft>
               <a:defRPr sz="2000" b="1">
                 <a:solidFill>
@@ -5750,11 +5748,11 @@
             </a:r>
           </a:p>
           <a:p>
-            <a:pPr lvl="1">
-              <a:spcAft>
-                <a:spcPts val="600"/>
-              </a:spcAft>
-              <a:defRPr sz="1800" b="0">
+            <a:pPr>
+              <a:spcAft>
+                <a:spcPts val="400"/>
+              </a:spcAft>
+              <a:defRPr sz="1700" b="0">
                 <a:solidFill>
                   <a:srgbClr val="000000"/>
                 </a:solidFill>
@@ -5766,11 +5764,11 @@
             </a:r>
           </a:p>
           <a:p>
-            <a:pPr lvl="1">
-              <a:spcAft>
-                <a:spcPts val="600"/>
-              </a:spcAft>
-              <a:defRPr sz="1800" b="0">
+            <a:pPr>
+              <a:spcAft>
+                <a:spcPts val="400"/>
+              </a:spcAft>
+              <a:defRPr sz="1700" b="0">
                 <a:solidFill>
                   <a:srgbClr val="000000"/>
                 </a:solidFill>
@@ -5782,13 +5780,13 @@
             </a:r>
           </a:p>
           <a:p>
-            <a:pPr lvl="1">
-              <a:spcAft>
-                <a:spcPts val="600"/>
-              </a:spcAft>
-              <a:defRPr sz="1800" b="1">
-                <a:solidFill>
-                  <a:srgbClr val="2E75B6"/>
+            <a:pPr>
+              <a:spcAft>
+                <a:spcPts val="400"/>
+              </a:spcAft>
+              <a:defRPr sz="1700" b="0">
+                <a:solidFill>
+                  <a:srgbClr val="000000"/>
                 </a:solidFill>
                 <a:latin typeface="Calibri"/>
               </a:defRPr>
@@ -5800,9 +5798,9 @@
           <a:p>
             <a:pPr>
               <a:spcAft>
-                <a:spcPts val="600"/>
-              </a:spcAft>
-              <a:defRPr sz="1800" b="0">
+                <a:spcPts val="400"/>
+              </a:spcAft>
+              <a:defRPr sz="400" b="0">
                 <a:solidFill>
                   <a:srgbClr val="000000"/>
                 </a:solidFill>
@@ -5813,63 +5811,60 @@
           <a:p>
             <a:pPr>
               <a:spcAft>
-                <a:spcPts val="600"/>
+                <a:spcPts val="400"/>
               </a:spcAft>
               <a:defRPr sz="2000" b="1">
                 <a:solidFill>
+                  <a:srgbClr val="1B3A5C"/>
+                </a:solidFill>
+                <a:latin typeface="Calibri"/>
+              </a:defRPr>
+            </a:pPr>
+            <a:r>
+              <a:t>Rule: If sensor &gt; threshold → on the line. If sensor &lt; threshold → off the line.</a:t>
+            </a:r>
+          </a:p>
+          <a:p>
+            <a:pPr>
+              <a:spcAft>
+                <a:spcPts val="400"/>
+              </a:spcAft>
+              <a:defRPr sz="400" b="0">
+                <a:solidFill>
                   <a:srgbClr val="000000"/>
                 </a:solidFill>
                 <a:latin typeface="Calibri"/>
               </a:defRPr>
             </a:pPr>
-            <a:r>
-              <a:t>Rule: If sensor &gt; threshold → on the line</a:t>
-            </a:r>
-          </a:p>
-          <a:p>
-            <a:pPr>
-              <a:spcAft>
-                <a:spcPts val="600"/>
+          </a:p>
+          <a:p>
+            <a:pPr>
+              <a:spcAft>
+                <a:spcPts val="400"/>
               </a:spcAft>
               <a:defRPr sz="2000" b="1">
                 <a:solidFill>
+                  <a:srgbClr val="1B3A5C"/>
+                </a:solidFill>
+                <a:latin typeface="Calibri"/>
+              </a:defRPr>
+            </a:pPr>
+            <a:r>
+              <a:t>Important: The threshold depends on YOUR surface and tape. Calibrate!</a:t>
+            </a:r>
+          </a:p>
+          <a:p>
+            <a:pPr>
+              <a:spcAft>
+                <a:spcPts val="400"/>
+              </a:spcAft>
+              <a:defRPr sz="400" b="0">
+                <a:solidFill>
                   <a:srgbClr val="000000"/>
                 </a:solidFill>
                 <a:latin typeface="Calibri"/>
               </a:defRPr>
             </a:pPr>
-            <a:r>
-              <a:t>Rule: If sensor &lt; threshold → off the line</a:t>
-            </a:r>
-          </a:p>
-          <a:p>
-            <a:pPr>
-              <a:spcAft>
-                <a:spcPts val="600"/>
-              </a:spcAft>
-              <a:defRPr sz="1800" b="0">
-                <a:solidFill>
-                  <a:srgbClr val="000000"/>
-                </a:solidFill>
-                <a:latin typeface="Calibri"/>
-              </a:defRPr>
-            </a:pPr>
-          </a:p>
-          <a:p>
-            <a:pPr>
-              <a:spcAft>
-                <a:spcPts val="600"/>
-              </a:spcAft>
-              <a:defRPr sz="2000" b="1">
-                <a:solidFill>
-                  <a:srgbClr val="2E75B6"/>
-                </a:solidFill>
-                <a:latin typeface="Calibri"/>
-              </a:defRPr>
-            </a:pPr>
-            <a:r>
-              <a:t>Important: The threshold depends on YOUR surface and tape. Calibrate!</a:t>
-            </a:r>
           </a:p>
         </p:txBody>
       </p:sp>
@@ -5979,7 +5974,7 @@
         <p:spPr>
           <a:xfrm>
             <a:off x="548640" y="1371600"/>
-            <a:ext cx="10972800" cy="5029200"/>
+            <a:ext cx="10972800" cy="365760"/>
           </a:xfrm>
           <a:prstGeom prst="rect">
             <a:avLst/>
@@ -5991,13 +5986,12 @@
             <a:spAutoFit/>
           </a:bodyPr>
           <a:lstStyle/>
-          <a:p/>
-          <a:p>
-            <a:pPr>
-              <a:spcAft>
-                <a:spcPts val="600"/>
-              </a:spcAft>
-              <a:defRPr sz="2200" b="1">
+          <a:p>
+            <a:pPr>
+              <a:spcAft>
+                <a:spcPts val="400"/>
+              </a:spcAft>
+              <a:defRPr sz="2000" b="1">
                 <a:solidFill>
                   <a:srgbClr val="1B3A5C"/>
                 </a:solidFill>
@@ -6011,9 +6005,9 @@
           <a:p>
             <a:pPr>
               <a:spcAft>
-                <a:spcPts val="600"/>
-              </a:spcAft>
-              <a:defRPr sz="1800" b="0">
+                <a:spcPts val="400"/>
+              </a:spcAft>
+              <a:defRPr sz="1700" b="0">
                 <a:solidFill>
                   <a:srgbClr val="000000"/>
                 </a:solidFill>
@@ -6021,15 +6015,15 @@
               </a:defRPr>
             </a:pPr>
             <a:r>
-              <a:t>1. Place robot on WHITE surface → record sensor values</a:t>
-            </a:r>
-          </a:p>
-          <a:p>
-            <a:pPr>
-              <a:spcAft>
-                <a:spcPts val="600"/>
-              </a:spcAft>
-              <a:defRPr sz="1800" b="0">
+              <a:t>Place robot on WHITE surface → record sensor values</a:t>
+            </a:r>
+          </a:p>
+          <a:p>
+            <a:pPr>
+              <a:spcAft>
+                <a:spcPts val="400"/>
+              </a:spcAft>
+              <a:defRPr sz="1700" b="0">
                 <a:solidFill>
                   <a:srgbClr val="000000"/>
                 </a:solidFill>
@@ -6037,15 +6031,15 @@
               </a:defRPr>
             </a:pPr>
             <a:r>
-              <a:t>2. Place robot on BLACK line → record sensor values</a:t>
-            </a:r>
-          </a:p>
-          <a:p>
-            <a:pPr>
-              <a:spcAft>
-                <a:spcPts val="600"/>
-              </a:spcAft>
-              <a:defRPr sz="1800" b="0">
+              <a:t>Place robot on BLACK line → record sensor values</a:t>
+            </a:r>
+          </a:p>
+          <a:p>
+            <a:pPr>
+              <a:spcAft>
+                <a:spcPts val="400"/>
+              </a:spcAft>
+              <a:defRPr sz="1700" b="0">
                 <a:solidFill>
                   <a:srgbClr val="000000"/>
                 </a:solidFill>
@@ -6053,15 +6047,15 @@
               </a:defRPr>
             </a:pPr>
             <a:r>
-              <a:t>3. Place robot on EDGE of line → record sensor values</a:t>
-            </a:r>
-          </a:p>
-          <a:p>
-            <a:pPr>
-              <a:spcAft>
-                <a:spcPts val="600"/>
-              </a:spcAft>
-              <a:defRPr sz="1800" b="0">
+              <a:t>Place robot on EDGE of line → record sensor values</a:t>
+            </a:r>
+          </a:p>
+          <a:p>
+            <a:pPr>
+              <a:spcAft>
+                <a:spcPts val="400"/>
+              </a:spcAft>
+              <a:defRPr sz="1700" b="0">
                 <a:solidFill>
                   <a:srgbClr val="000000"/>
                 </a:solidFill>
@@ -6069,15 +6063,15 @@
               </a:defRPr>
             </a:pPr>
             <a:r>
-              <a:t>4. Calculate your threshold (halfway between off-line and on-line averages)</a:t>
-            </a:r>
-          </a:p>
-          <a:p>
-            <a:pPr>
-              <a:spcAft>
-                <a:spcPts val="600"/>
-              </a:spcAft>
-              <a:defRPr sz="1800" b="0">
+              <a:t>Calculate your threshold (halfway between off-line and on-line averages)</a:t>
+            </a:r>
+          </a:p>
+          <a:p>
+            <a:pPr>
+              <a:spcAft>
+                <a:spcPts val="400"/>
+              </a:spcAft>
+              <a:defRPr sz="400" b="0">
                 <a:solidFill>
                   <a:srgbClr val="000000"/>
                 </a:solidFill>
@@ -6088,25 +6082,9 @@
           <a:p>
             <a:pPr>
               <a:spcAft>
-                <a:spcPts val="600"/>
-              </a:spcAft>
-              <a:defRPr sz="2200" b="1">
-                <a:solidFill>
-                  <a:srgbClr val="1B3A5C"/>
-                </a:solidFill>
-                <a:latin typeface="Calibri"/>
-              </a:defRPr>
-            </a:pPr>
-            <a:r>
-              <a:t>Why calibrate?</a:t>
-            </a:r>
-          </a:p>
-          <a:p>
-            <a:pPr>
-              <a:spcAft>
-                <a:spcPts val="600"/>
-              </a:spcAft>
-              <a:defRPr sz="1800" b="0">
+                <a:spcPts val="400"/>
+              </a:spcAft>
+              <a:defRPr sz="1700" b="0">
                 <a:solidFill>
                   <a:srgbClr val="000000"/>
                 </a:solidFill>
@@ -6114,15 +6092,15 @@
               </a:defRPr>
             </a:pPr>
             <a:r>
-              <a:t>Different surfaces, tape colors, and lighting conditions give different values.</a:t>
-            </a:r>
-          </a:p>
-          <a:p>
-            <a:pPr>
-              <a:spcAft>
-                <a:spcPts val="600"/>
-              </a:spcAft>
-              <a:defRPr sz="1800" b="0">
+              <a:t>Why calibrate? Different surfaces, tape colors, and lighting conditions give different values.</a:t>
+            </a:r>
+          </a:p>
+          <a:p>
+            <a:pPr>
+              <a:spcAft>
+                <a:spcPts val="400"/>
+              </a:spcAft>
+              <a:defRPr sz="400" b="0">
                 <a:solidFill>
                   <a:srgbClr val="000000"/>
                 </a:solidFill>
@@ -6133,11 +6111,11 @@
           <a:p>
             <a:pPr>
               <a:spcAft>
-                <a:spcPts val="600"/>
-              </a:spcAft>
-              <a:defRPr sz="2000" b="1">
-                <a:solidFill>
-                  <a:srgbClr val="2E75B6"/>
+                <a:spcPts val="400"/>
+              </a:spcAft>
+              <a:defRPr sz="1700" b="0">
+                <a:solidFill>
+                  <a:srgbClr val="000000"/>
                 </a:solidFill>
                 <a:latin typeface="Calibri"/>
               </a:defRPr>
@@ -6145,6 +6123,19 @@
             <a:r>
               <a:t>Save your threshold! You'll use it for the rest of Module 2.</a:t>
             </a:r>
+          </a:p>
+          <a:p>
+            <a:pPr>
+              <a:spcAft>
+                <a:spcPts val="400"/>
+              </a:spcAft>
+              <a:defRPr sz="400" b="0">
+                <a:solidFill>
+                  <a:srgbClr val="000000"/>
+                </a:solidFill>
+                <a:latin typeface="Calibri"/>
+              </a:defRPr>
+            </a:pPr>
           </a:p>
         </p:txBody>
       </p:sp>
@@ -6254,7 +6245,7 @@
         <p:spPr>
           <a:xfrm>
             <a:off x="548640" y="1371600"/>
-            <a:ext cx="5486400" cy="4572000"/>
+            <a:ext cx="10972800" cy="365760"/>
           </a:xfrm>
           <a:prstGeom prst="rect">
             <a:avLst/>
@@ -6266,13 +6257,12 @@
             <a:spAutoFit/>
           </a:bodyPr>
           <a:lstStyle/>
-          <a:p/>
-          <a:p>
-            <a:pPr>
-              <a:spcAft>
-                <a:spcPts val="600"/>
-              </a:spcAft>
-              <a:defRPr sz="2200" b="1">
+          <a:p>
+            <a:pPr>
+              <a:spcAft>
+                <a:spcPts val="400"/>
+              </a:spcAft>
+              <a:defRPr sz="2000" b="1">
                 <a:solidFill>
                   <a:srgbClr val="1B3A5C"/>
                 </a:solidFill>
@@ -6286,9 +6276,9 @@
           <a:p>
             <a:pPr>
               <a:spcAft>
-                <a:spcPts val="600"/>
-              </a:spcAft>
-              <a:defRPr sz="1800" b="0">
+                <a:spcPts val="400"/>
+              </a:spcAft>
+              <a:defRPr sz="1700" b="0">
                 <a:solidFill>
                   <a:srgbClr val="000000"/>
                 </a:solidFill>
@@ -6296,15 +6286,15 @@
               </a:defRPr>
             </a:pPr>
             <a:r>
-              <a:t>1. Create sensor_test.py</a:t>
-            </a:r>
-          </a:p>
-          <a:p>
-            <a:pPr>
-              <a:spcAft>
-                <a:spcPts val="600"/>
-              </a:spcAft>
-              <a:defRPr sz="1800" b="0">
+              <a:t>Create sensor_test.py</a:t>
+            </a:r>
+          </a:p>
+          <a:p>
+            <a:pPr>
+              <a:spcAft>
+                <a:spcPts val="400"/>
+              </a:spcAft>
+              <a:defRPr sz="1700" b="0">
                 <a:solidFill>
                   <a:srgbClr val="000000"/>
                 </a:solidFill>
@@ -6312,15 +6302,15 @@
               </a:defRPr>
             </a:pPr>
             <a:r>
-              <a:t>2. Write the continuous reading program</a:t>
-            </a:r>
-          </a:p>
-          <a:p>
-            <a:pPr>
-              <a:spcAft>
-                <a:spcPts val="600"/>
-              </a:spcAft>
-              <a:defRPr sz="1800" b="0">
+              <a:t>Write the continuous reading program</a:t>
+            </a:r>
+          </a:p>
+          <a:p>
+            <a:pPr>
+              <a:spcAft>
+                <a:spcPts val="400"/>
+              </a:spcAft>
+              <a:defRPr sz="1700" b="0">
                 <a:solidFill>
                   <a:srgbClr val="000000"/>
                 </a:solidFill>
@@ -6328,15 +6318,15 @@
               </a:defRPr>
             </a:pPr>
             <a:r>
-              <a:t>3. Collect calibration data for 3 positions</a:t>
-            </a:r>
-          </a:p>
-          <a:p>
-            <a:pPr>
-              <a:spcAft>
-                <a:spcPts val="600"/>
-              </a:spcAft>
-              <a:defRPr sz="1800" b="0">
+              <a:t>Collect calibration data for 3 positions</a:t>
+            </a:r>
+          </a:p>
+          <a:p>
+            <a:pPr>
+              <a:spcAft>
+                <a:spcPts val="400"/>
+              </a:spcAft>
+              <a:defRPr sz="1700" b="0">
                 <a:solidFill>
                   <a:srgbClr val="000000"/>
                 </a:solidFill>
@@ -6344,15 +6334,15 @@
               </a:defRPr>
             </a:pPr>
             <a:r>
-              <a:t>4. Record in your worksheet</a:t>
-            </a:r>
-          </a:p>
-          <a:p>
-            <a:pPr>
-              <a:spcAft>
-                <a:spcPts val="600"/>
-              </a:spcAft>
-              <a:defRPr sz="1800" b="0">
+              <a:t>Record in your worksheet</a:t>
+            </a:r>
+          </a:p>
+          <a:p>
+            <a:pPr>
+              <a:spcAft>
+                <a:spcPts val="400"/>
+              </a:spcAft>
+              <a:defRPr sz="1700" b="0">
                 <a:solidFill>
                   <a:srgbClr val="000000"/>
                 </a:solidFill>
@@ -6360,39 +6350,28 @@
               </a:defRPr>
             </a:pPr>
             <a:r>
-              <a:t>5. Determine your threshold value</a:t>
-            </a:r>
-          </a:p>
-        </p:txBody>
-      </p:sp>
-      <p:sp>
-        <p:nvSpPr>
-          <p:cNvPr id="5" name="TextBox 4"/>
-          <p:cNvSpPr txBox="1"/>
-          <p:nvPr/>
-        </p:nvSpPr>
-        <p:spPr>
-          <a:xfrm>
-            <a:off x="6858000" y="1371600"/>
-            <a:ext cx="4572000" cy="4572000"/>
-          </a:xfrm>
-          <a:prstGeom prst="rect">
-            <a:avLst/>
-          </a:prstGeom>
-          <a:noFill/>
-        </p:spPr>
-        <p:txBody>
-          <a:bodyPr wrap="square">
-            <a:spAutoFit/>
-          </a:bodyPr>
-          <a:lstStyle/>
-          <a:p/>
-          <a:p>
-            <a:pPr>
-              <a:spcAft>
-                <a:spcPts val="600"/>
-              </a:spcAft>
-              <a:defRPr sz="2200" b="1">
+              <a:t>Determine your threshold value</a:t>
+            </a:r>
+          </a:p>
+          <a:p>
+            <a:pPr>
+              <a:spcAft>
+                <a:spcPts val="400"/>
+              </a:spcAft>
+              <a:defRPr sz="400" b="0">
+                <a:solidFill>
+                  <a:srgbClr val="000000"/>
+                </a:solidFill>
+                <a:latin typeface="Calibri"/>
+              </a:defRPr>
+            </a:pPr>
+          </a:p>
+          <a:p>
+            <a:pPr>
+              <a:spcAft>
+                <a:spcPts val="400"/>
+              </a:spcAft>
+              <a:defRPr sz="2000" b="1">
                 <a:solidFill>
                   <a:srgbClr val="1B3A5C"/>
                 </a:solidFill>
@@ -6406,9 +6385,9 @@
           <a:p>
             <a:pPr>
               <a:spcAft>
-                <a:spcPts val="600"/>
-              </a:spcAft>
-              <a:defRPr sz="1800" b="0">
+                <a:spcPts val="400"/>
+              </a:spcAft>
+              <a:defRPr sz="1700" b="0">
                 <a:solidFill>
                   <a:srgbClr val="000000"/>
                 </a:solidFill>
@@ -6422,9 +6401,9 @@
           <a:p>
             <a:pPr>
               <a:spcAft>
-                <a:spcPts val="600"/>
-              </a:spcAft>
-              <a:defRPr sz="1800" b="0">
+                <a:spcPts val="400"/>
+              </a:spcAft>
+              <a:defRPr sz="1700" b="0">
                 <a:solidFill>
                   <a:srgbClr val="000000"/>
                 </a:solidFill>
@@ -6438,9 +6417,9 @@
           <a:p>
             <a:pPr>
               <a:spcAft>
-                <a:spcPts val="600"/>
-              </a:spcAft>
-              <a:defRPr sz="1800" b="0">
+                <a:spcPts val="400"/>
+              </a:spcAft>
+              <a:defRPr sz="1700" b="0">
                 <a:solidFill>
                   <a:srgbClr val="000000"/>
                 </a:solidFill>
@@ -6450,6 +6429,19 @@
             <a:r>
               <a:t>Did you find a good threshold?</a:t>
             </a:r>
+          </a:p>
+          <a:p>
+            <a:pPr>
+              <a:spcAft>
+                <a:spcPts val="400"/>
+              </a:spcAft>
+              <a:defRPr sz="400" b="0">
+                <a:solidFill>
+                  <a:srgbClr val="000000"/>
+                </a:solidFill>
+                <a:latin typeface="Calibri"/>
+              </a:defRPr>
+            </a:pPr>
           </a:p>
         </p:txBody>
       </p:sp>

</xml_diff>